<commit_message>
fix(springboottesting): merged with main, fixed broken links
</commit_message>
<xml_diff>
--- a/content/en/docs/java/spring-framework/spring-boot-testing/zwiebelprinzip.pptx
+++ b/content/en/docs/java/spring-framework/spring-boot-testing/zwiebelprinzip.pptx
@@ -266,7 +266,7 @@
           <a:p>
             <a:fld id="{CC485AA8-D36E-4B31-9BCC-E3E7E8DC6EC0}" type="datetimeFigureOut">
               <a:rPr lang="de-CH" smtClean="0"/>
-              <a:t>04.11.2024</a:t>
+              <a:t>31.01.2025</a:t>
             </a:fld>
             <a:endParaRPr lang="de-CH" dirty="0"/>
           </a:p>
@@ -466,7 +466,7 @@
           <a:p>
             <a:fld id="{CC485AA8-D36E-4B31-9BCC-E3E7E8DC6EC0}" type="datetimeFigureOut">
               <a:rPr lang="de-CH" smtClean="0"/>
-              <a:t>04.11.2024</a:t>
+              <a:t>31.01.2025</a:t>
             </a:fld>
             <a:endParaRPr lang="de-CH" dirty="0"/>
           </a:p>
@@ -676,7 +676,7 @@
           <a:p>
             <a:fld id="{CC485AA8-D36E-4B31-9BCC-E3E7E8DC6EC0}" type="datetimeFigureOut">
               <a:rPr lang="de-CH" smtClean="0"/>
-              <a:t>04.11.2024</a:t>
+              <a:t>31.01.2025</a:t>
             </a:fld>
             <a:endParaRPr lang="de-CH" dirty="0"/>
           </a:p>
@@ -876,7 +876,7 @@
           <a:p>
             <a:fld id="{CC485AA8-D36E-4B31-9BCC-E3E7E8DC6EC0}" type="datetimeFigureOut">
               <a:rPr lang="de-CH" smtClean="0"/>
-              <a:t>04.11.2024</a:t>
+              <a:t>31.01.2025</a:t>
             </a:fld>
             <a:endParaRPr lang="de-CH" dirty="0"/>
           </a:p>
@@ -1152,7 +1152,7 @@
           <a:p>
             <a:fld id="{CC485AA8-D36E-4B31-9BCC-E3E7E8DC6EC0}" type="datetimeFigureOut">
               <a:rPr lang="de-CH" smtClean="0"/>
-              <a:t>04.11.2024</a:t>
+              <a:t>31.01.2025</a:t>
             </a:fld>
             <a:endParaRPr lang="de-CH" dirty="0"/>
           </a:p>
@@ -1420,7 +1420,7 @@
           <a:p>
             <a:fld id="{CC485AA8-D36E-4B31-9BCC-E3E7E8DC6EC0}" type="datetimeFigureOut">
               <a:rPr lang="de-CH" smtClean="0"/>
-              <a:t>04.11.2024</a:t>
+              <a:t>31.01.2025</a:t>
             </a:fld>
             <a:endParaRPr lang="de-CH" dirty="0"/>
           </a:p>
@@ -1835,7 +1835,7 @@
           <a:p>
             <a:fld id="{CC485AA8-D36E-4B31-9BCC-E3E7E8DC6EC0}" type="datetimeFigureOut">
               <a:rPr lang="de-CH" smtClean="0"/>
-              <a:t>04.11.2024</a:t>
+              <a:t>31.01.2025</a:t>
             </a:fld>
             <a:endParaRPr lang="de-CH" dirty="0"/>
           </a:p>
@@ -1977,7 +1977,7 @@
           <a:p>
             <a:fld id="{CC485AA8-D36E-4B31-9BCC-E3E7E8DC6EC0}" type="datetimeFigureOut">
               <a:rPr lang="de-CH" smtClean="0"/>
-              <a:t>04.11.2024</a:t>
+              <a:t>31.01.2025</a:t>
             </a:fld>
             <a:endParaRPr lang="de-CH" dirty="0"/>
           </a:p>
@@ -2090,7 +2090,7 @@
           <a:p>
             <a:fld id="{CC485AA8-D36E-4B31-9BCC-E3E7E8DC6EC0}" type="datetimeFigureOut">
               <a:rPr lang="de-CH" smtClean="0"/>
-              <a:t>04.11.2024</a:t>
+              <a:t>31.01.2025</a:t>
             </a:fld>
             <a:endParaRPr lang="de-CH" dirty="0"/>
           </a:p>
@@ -2403,7 +2403,7 @@
           <a:p>
             <a:fld id="{CC485AA8-D36E-4B31-9BCC-E3E7E8DC6EC0}" type="datetimeFigureOut">
               <a:rPr lang="de-CH" smtClean="0"/>
-              <a:t>04.11.2024</a:t>
+              <a:t>31.01.2025</a:t>
             </a:fld>
             <a:endParaRPr lang="de-CH" dirty="0"/>
           </a:p>
@@ -2692,7 +2692,7 @@
           <a:p>
             <a:fld id="{CC485AA8-D36E-4B31-9BCC-E3E7E8DC6EC0}" type="datetimeFigureOut">
               <a:rPr lang="de-CH" smtClean="0"/>
-              <a:t>04.11.2024</a:t>
+              <a:t>31.01.2025</a:t>
             </a:fld>
             <a:endParaRPr lang="de-CH" dirty="0"/>
           </a:p>
@@ -2935,7 +2935,7 @@
           <a:p>
             <a:fld id="{CC485AA8-D36E-4B31-9BCC-E3E7E8DC6EC0}" type="datetimeFigureOut">
               <a:rPr lang="de-CH" smtClean="0"/>
-              <a:t>04.11.2024</a:t>
+              <a:t>31.01.2025</a:t>
             </a:fld>
             <a:endParaRPr lang="de-CH" dirty="0"/>
           </a:p>
@@ -4041,8 +4041,8 @@
         </p:nvSpPr>
         <p:spPr>
           <a:xfrm>
-            <a:off x="1904673" y="2129880"/>
-            <a:ext cx="2038708" cy="369332"/>
+            <a:off x="1616782" y="1849464"/>
+            <a:ext cx="2614490" cy="646331"/>
           </a:xfrm>
           <a:prstGeom prst="rect">
             <a:avLst/>
@@ -4065,7 +4065,7 @@
                 </a:solidFill>
                 <a:latin typeface="SBB Light" pitchFamily="2" charset="0"/>
               </a:rPr>
-              <a:t>@DataJpaTest</a:t>
+              <a:t>@DataJpaTest oder @DataJdbcTest</a:t>
             </a:r>
           </a:p>
         </p:txBody>
@@ -8900,8 +8900,8 @@
         </p:nvSpPr>
         <p:spPr>
           <a:xfrm>
-            <a:off x="1316277" y="396495"/>
-            <a:ext cx="2038708" cy="369332"/>
+            <a:off x="793936" y="237999"/>
+            <a:ext cx="2863934" cy="646331"/>
           </a:xfrm>
           <a:prstGeom prst="rect">
             <a:avLst/>
@@ -8924,7 +8924,7 @@
                 </a:solidFill>
                 <a:latin typeface="SBB Light" pitchFamily="2" charset="0"/>
               </a:rPr>
-              <a:t>@DataJpaTest</a:t>
+              <a:t>@DataJpaTest oder @DataJdbcTest</a:t>
             </a:r>
           </a:p>
         </p:txBody>

</xml_diff>